<commit_message>
# add OneToMany Sample
</commit_message>
<xml_diff>
--- a/doc/Spring JPA配置.pptx
+++ b/doc/Spring JPA配置.pptx
@@ -20,11 +20,12 @@
     <p:sldId id="271" r:id="rId14"/>
     <p:sldId id="272" r:id="rId15"/>
     <p:sldId id="274" r:id="rId16"/>
-    <p:sldId id="275" r:id="rId17"/>
-    <p:sldId id="259" r:id="rId18"/>
-    <p:sldId id="258" r:id="rId19"/>
-    <p:sldId id="260" r:id="rId20"/>
-    <p:sldId id="261" r:id="rId21"/>
+    <p:sldId id="276" r:id="rId17"/>
+    <p:sldId id="275" r:id="rId18"/>
+    <p:sldId id="259" r:id="rId19"/>
+    <p:sldId id="258" r:id="rId20"/>
+    <p:sldId id="260" r:id="rId21"/>
+    <p:sldId id="261" r:id="rId22"/>
   </p:sldIdLst>
   <p:sldSz cx="9144000" cy="6858000" type="screen4x3"/>
   <p:notesSz cx="6858000" cy="9144000"/>
@@ -336,7 +337,7 @@
           <a:p>
             <a:fld id="{5BBEAD13-0566-4C6C-97E7-55F17F24B09F}" type="datetimeFigureOut">
               <a:rPr lang="zh-TW" altLang="en-US" smtClean="0"/>
-              <a:t>2018/5/26</a:t>
+              <a:t>2018/5/27</a:t>
             </a:fld>
             <a:endParaRPr lang="zh-TW" altLang="en-US"/>
           </a:p>
@@ -689,7 +690,7 @@
           <a:p>
             <a:fld id="{5BBEAD13-0566-4C6C-97E7-55F17F24B09F}" type="datetimeFigureOut">
               <a:rPr lang="zh-TW" altLang="en-US" smtClean="0"/>
-              <a:t>2018/5/26</a:t>
+              <a:t>2018/5/27</a:t>
             </a:fld>
             <a:endParaRPr lang="zh-TW" altLang="en-US"/>
           </a:p>
@@ -864,7 +865,7 @@
           <a:p>
             <a:fld id="{5BBEAD13-0566-4C6C-97E7-55F17F24B09F}" type="datetimeFigureOut">
               <a:rPr lang="zh-TW" altLang="en-US" smtClean="0"/>
-              <a:t>2018/5/26</a:t>
+              <a:t>2018/5/27</a:t>
             </a:fld>
             <a:endParaRPr lang="zh-TW" altLang="en-US"/>
           </a:p>
@@ -977,7 +978,7 @@
           <a:p>
             <a:fld id="{5BBEAD13-0566-4C6C-97E7-55F17F24B09F}" type="datetimeFigureOut">
               <a:rPr lang="zh-TW" altLang="en-US" smtClean="0"/>
-              <a:t>2018/5/26</a:t>
+              <a:t>2018/5/27</a:t>
             </a:fld>
             <a:endParaRPr lang="zh-TW" altLang="en-US"/>
           </a:p>
@@ -1335,7 +1336,7 @@
           <a:p>
             <a:fld id="{5BBEAD13-0566-4C6C-97E7-55F17F24B09F}" type="datetimeFigureOut">
               <a:rPr lang="zh-TW" altLang="en-US" smtClean="0"/>
-              <a:t>2018/5/26</a:t>
+              <a:t>2018/5/27</a:t>
             </a:fld>
             <a:endParaRPr lang="zh-TW" altLang="en-US"/>
           </a:p>
@@ -1600,7 +1601,7 @@
           <a:p>
             <a:fld id="{5BBEAD13-0566-4C6C-97E7-55F17F24B09F}" type="datetimeFigureOut">
               <a:rPr lang="zh-TW" altLang="en-US" smtClean="0"/>
-              <a:t>2018/5/26</a:t>
+              <a:t>2018/5/27</a:t>
             </a:fld>
             <a:endParaRPr lang="zh-TW" altLang="en-US"/>
           </a:p>
@@ -1962,7 +1963,7 @@
           <a:p>
             <a:fld id="{5BBEAD13-0566-4C6C-97E7-55F17F24B09F}" type="datetimeFigureOut">
               <a:rPr lang="zh-TW" altLang="en-US" smtClean="0"/>
-              <a:t>2018/5/26</a:t>
+              <a:t>2018/5/27</a:t>
             </a:fld>
             <a:endParaRPr lang="zh-TW" altLang="en-US"/>
           </a:p>
@@ -2189,7 +2190,7 @@
           <a:p>
             <a:fld id="{5BBEAD13-0566-4C6C-97E7-55F17F24B09F}" type="datetimeFigureOut">
               <a:rPr lang="zh-TW" altLang="en-US" smtClean="0"/>
-              <a:t>2018/5/26</a:t>
+              <a:t>2018/5/27</a:t>
             </a:fld>
             <a:endParaRPr lang="zh-TW" altLang="en-US"/>
           </a:p>
@@ -2279,7 +2280,7 @@
           <a:p>
             <a:fld id="{5BBEAD13-0566-4C6C-97E7-55F17F24B09F}" type="datetimeFigureOut">
               <a:rPr lang="zh-TW" altLang="en-US" smtClean="0"/>
-              <a:t>2018/5/26</a:t>
+              <a:t>2018/5/27</a:t>
             </a:fld>
             <a:endParaRPr lang="zh-TW" altLang="en-US"/>
           </a:p>
@@ -2546,7 +2547,7 @@
           <a:p>
             <a:fld id="{5BBEAD13-0566-4C6C-97E7-55F17F24B09F}" type="datetimeFigureOut">
               <a:rPr lang="zh-TW" altLang="en-US" smtClean="0"/>
-              <a:t>2018/5/26</a:t>
+              <a:t>2018/5/27</a:t>
             </a:fld>
             <a:endParaRPr lang="zh-TW" altLang="en-US"/>
           </a:p>
@@ -2774,7 +2775,7 @@
           <a:p>
             <a:fld id="{5BBEAD13-0566-4C6C-97E7-55F17F24B09F}" type="datetimeFigureOut">
               <a:rPr lang="zh-TW" altLang="en-US" smtClean="0"/>
-              <a:t>2018/5/26</a:t>
+              <a:t>2018/5/27</a:t>
             </a:fld>
             <a:endParaRPr lang="zh-TW" altLang="en-US"/>
           </a:p>
@@ -3273,7 +3274,7 @@
           <a:p>
             <a:fld id="{5BBEAD13-0566-4C6C-97E7-55F17F24B09F}" type="datetimeFigureOut">
               <a:rPr lang="zh-TW" altLang="en-US" smtClean="0"/>
-              <a:t>2018/5/26</a:t>
+              <a:t>2018/5/27</a:t>
             </a:fld>
             <a:endParaRPr lang="zh-TW" altLang="en-US"/>
           </a:p>
@@ -5188,7 +5189,7 @@
           <p:cNvPr id="2" name="標題 1">
             <a:extLst>
               <a:ext uri="{FF2B5EF4-FFF2-40B4-BE49-F238E27FC236}">
-                <a16:creationId xmlns:a16="http://schemas.microsoft.com/office/drawing/2014/main" id="{CF2E329D-3848-4DF9-9894-DB8E9C60DCA9}"/>
+                <a16:creationId xmlns:a16="http://schemas.microsoft.com/office/drawing/2014/main" id="{889FC779-00C8-44E7-BF69-CE17D3717732}"/>
               </a:ext>
             </a:extLst>
           </p:cNvPr>
@@ -5201,52 +5202,67 @@
         </p:nvSpPr>
         <p:spPr/>
         <p:txBody>
+          <a:bodyPr/>
+          <a:lstStyle/>
+          <a:p>
+            <a:r>
+              <a:rPr lang="en-US" altLang="zh-TW" dirty="0"/>
+              <a:t>@</a:t>
+            </a:r>
+            <a:r>
+              <a:rPr lang="en-US" altLang="zh-TW" dirty="0" err="1"/>
+              <a:t>OneToMany</a:t>
+            </a:r>
+            <a:r>
+              <a:rPr lang="en-US" altLang="zh-TW" dirty="0"/>
+              <a:t> (</a:t>
+            </a:r>
+            <a:r>
+              <a:rPr lang="zh-CN" altLang="en-US" dirty="0"/>
+              <a:t>一對多關聯性</a:t>
+            </a:r>
+            <a:r>
+              <a:rPr lang="en-US" altLang="zh-TW" dirty="0"/>
+              <a:t>)</a:t>
+            </a:r>
+            <a:endParaRPr lang="zh-TW" altLang="en-US" dirty="0"/>
+          </a:p>
+        </p:txBody>
+      </p:sp>
+      <p:sp>
+        <p:nvSpPr>
+          <p:cNvPr id="3" name="內容版面配置區 2">
+            <a:extLst>
+              <a:ext uri="{FF2B5EF4-FFF2-40B4-BE49-F238E27FC236}">
+                <a16:creationId xmlns:a16="http://schemas.microsoft.com/office/drawing/2014/main" id="{E04BB258-55B3-49C7-A4CA-A43FCE0AC422}"/>
+              </a:ext>
+            </a:extLst>
+          </p:cNvPr>
+          <p:cNvSpPr>
+            <a:spLocks noGrp="1"/>
+          </p:cNvSpPr>
+          <p:nvPr>
+            <p:ph sz="quarter" idx="1"/>
+          </p:nvPr>
+        </p:nvSpPr>
+        <p:spPr/>
+        <p:txBody>
           <a:bodyPr>
             <a:normAutofit/>
           </a:bodyPr>
           <a:lstStyle/>
           <a:p>
             <a:r>
-              <a:rPr lang="en-US" altLang="zh-TW" sz="6000" dirty="0"/>
-              <a:t>JPA</a:t>
-            </a:r>
-            <a:r>
-              <a:rPr lang="zh-CN" altLang="en-US" sz="6000" dirty="0"/>
-              <a:t>的配置</a:t>
-            </a:r>
-            <a:endParaRPr lang="zh-TW" altLang="en-US" sz="6000" dirty="0"/>
-          </a:p>
-        </p:txBody>
-      </p:sp>
-      <p:sp>
-        <p:nvSpPr>
-          <p:cNvPr id="3" name="文字版面配置區 2">
-            <a:extLst>
-              <a:ext uri="{FF2B5EF4-FFF2-40B4-BE49-F238E27FC236}">
-                <a16:creationId xmlns:a16="http://schemas.microsoft.com/office/drawing/2014/main" id="{55923FA7-C953-4F6A-8B81-6BAEF2F89D6A}"/>
-              </a:ext>
-            </a:extLst>
-          </p:cNvPr>
-          <p:cNvSpPr>
-            <a:spLocks noGrp="1"/>
-          </p:cNvSpPr>
-          <p:nvPr>
-            <p:ph type="body" idx="1"/>
-          </p:nvPr>
-        </p:nvSpPr>
-        <p:spPr/>
-        <p:txBody>
-          <a:bodyPr/>
-          <a:lstStyle/>
-          <a:p>
-            <a:endParaRPr lang="zh-TW" altLang="en-US"/>
+              <a:rPr lang="zh-TW" altLang="en-US" dirty="0"/>
+              <a:t>單邊的一對多關聯性是指一方有集合屬性，包含多個多方，而多方沒有一方的參考</a:t>
+            </a:r>
           </a:p>
         </p:txBody>
       </p:sp>
     </p:spTree>
     <p:extLst>
       <p:ext uri="{BB962C8B-B14F-4D97-AF65-F5344CB8AC3E}">
-        <p14:creationId xmlns:p14="http://schemas.microsoft.com/office/powerpoint/2010/main" val="402189255"/>
+        <p14:creationId xmlns:p14="http://schemas.microsoft.com/office/powerpoint/2010/main" val="3793197950"/>
       </p:ext>
     </p:extLst>
   </p:cSld>
@@ -5275,7 +5291,13 @@
       </p:grpSpPr>
       <p:sp>
         <p:nvSpPr>
-          <p:cNvPr id="2" name="標題 1"/>
+          <p:cNvPr id="2" name="標題 1">
+            <a:extLst>
+              <a:ext uri="{FF2B5EF4-FFF2-40B4-BE49-F238E27FC236}">
+                <a16:creationId xmlns:a16="http://schemas.microsoft.com/office/drawing/2014/main" id="{CF2E329D-3848-4DF9-9894-DB8E9C60DCA9}"/>
+              </a:ext>
+            </a:extLst>
+          </p:cNvPr>
           <p:cNvSpPr>
             <a:spLocks noGrp="1"/>
           </p:cNvSpPr>
@@ -5291,20 +5313,26 @@
           <a:lstStyle/>
           <a:p>
             <a:r>
-              <a:rPr lang="en-US" altLang="zh-TW" sz="6000" dirty="0">
-                <a:latin typeface="Consolas" panose="020B0609020204030204" pitchFamily="49" charset="0"/>
-              </a:rPr>
-              <a:t>Reference</a:t>
-            </a:r>
-            <a:endParaRPr lang="zh-TW" altLang="en-US" sz="6000" dirty="0">
-              <a:latin typeface="Consolas" panose="020B0609020204030204" pitchFamily="49" charset="0"/>
-            </a:endParaRPr>
-          </a:p>
-        </p:txBody>
-      </p:sp>
-      <p:sp>
-        <p:nvSpPr>
-          <p:cNvPr id="3" name="文字版面配置區 2"/>
+              <a:rPr lang="en-US" altLang="zh-TW" sz="6000" dirty="0"/>
+              <a:t>JPA</a:t>
+            </a:r>
+            <a:r>
+              <a:rPr lang="zh-CN" altLang="en-US" sz="6000" dirty="0"/>
+              <a:t>的配置</a:t>
+            </a:r>
+            <a:endParaRPr lang="zh-TW" altLang="en-US" sz="6000" dirty="0"/>
+          </a:p>
+        </p:txBody>
+      </p:sp>
+      <p:sp>
+        <p:nvSpPr>
+          <p:cNvPr id="3" name="文字版面配置區 2">
+            <a:extLst>
+              <a:ext uri="{FF2B5EF4-FFF2-40B4-BE49-F238E27FC236}">
+                <a16:creationId xmlns:a16="http://schemas.microsoft.com/office/drawing/2014/main" id="{55923FA7-C953-4F6A-8B81-6BAEF2F89D6A}"/>
+              </a:ext>
+            </a:extLst>
+          </p:cNvPr>
           <p:cNvSpPr>
             <a:spLocks noGrp="1"/>
           </p:cNvSpPr>
@@ -5317,14 +5345,14 @@
           <a:bodyPr/>
           <a:lstStyle/>
           <a:p>
-            <a:endParaRPr lang="zh-TW" altLang="en-US" dirty="0"/>
+            <a:endParaRPr lang="zh-TW" altLang="en-US"/>
           </a:p>
         </p:txBody>
       </p:sp>
     </p:spTree>
     <p:extLst>
       <p:ext uri="{BB962C8B-B14F-4D97-AF65-F5344CB8AC3E}">
-        <p14:creationId xmlns:p14="http://schemas.microsoft.com/office/powerpoint/2010/main" val="2349993791"/>
+        <p14:creationId xmlns:p14="http://schemas.microsoft.com/office/powerpoint/2010/main" val="402189255"/>
       </p:ext>
     </p:extLst>
   </p:cSld>
@@ -5363,70 +5391,37 @@
         </p:nvSpPr>
         <p:spPr/>
         <p:txBody>
+          <a:bodyPr>
+            <a:normAutofit/>
+          </a:bodyPr>
+          <a:lstStyle/>
+          <a:p>
+            <a:r>
+              <a:rPr lang="en-US" altLang="zh-TW" sz="6000" dirty="0">
+                <a:latin typeface="Consolas" panose="020B0609020204030204" pitchFamily="49" charset="0"/>
+              </a:rPr>
+              <a:t>Reference</a:t>
+            </a:r>
+            <a:endParaRPr lang="zh-TW" altLang="en-US" sz="6000" dirty="0">
+              <a:latin typeface="Consolas" panose="020B0609020204030204" pitchFamily="49" charset="0"/>
+            </a:endParaRPr>
+          </a:p>
+        </p:txBody>
+      </p:sp>
+      <p:sp>
+        <p:nvSpPr>
+          <p:cNvPr id="3" name="文字版面配置區 2"/>
+          <p:cNvSpPr>
+            <a:spLocks noGrp="1"/>
+          </p:cNvSpPr>
+          <p:nvPr>
+            <p:ph type="body" idx="1"/>
+          </p:nvPr>
+        </p:nvSpPr>
+        <p:spPr/>
+        <p:txBody>
           <a:bodyPr/>
           <a:lstStyle/>
-          <a:p>
-            <a:r>
-              <a:rPr lang="en-US" altLang="zh-TW" dirty="0"/>
-              <a:t>Spring JPA </a:t>
-            </a:r>
-            <a:r>
-              <a:rPr lang="zh-TW" altLang="en-US" dirty="0"/>
-              <a:t>配置</a:t>
-            </a:r>
-          </a:p>
-        </p:txBody>
-      </p:sp>
-      <p:sp>
-        <p:nvSpPr>
-          <p:cNvPr id="3" name="內容版面配置區 2"/>
-          <p:cNvSpPr>
-            <a:spLocks noGrp="1"/>
-          </p:cNvSpPr>
-          <p:nvPr>
-            <p:ph sz="quarter" idx="1"/>
-          </p:nvPr>
-        </p:nvSpPr>
-        <p:spPr/>
-        <p:txBody>
-          <a:bodyPr/>
-          <a:lstStyle/>
-          <a:p>
-            <a:r>
-              <a:rPr lang="en-US" altLang="zh-TW" dirty="0">
-                <a:hlinkClick r:id="rId2"/>
-              </a:rPr>
-              <a:t>https://stevenitlife.blogspot.tw/2016/03/hibernate-spring-jpa-configure.html</a:t>
-            </a:r>
-            <a:endParaRPr lang="en-US" altLang="zh-TW" dirty="0"/>
-          </a:p>
-          <a:p>
-            <a:r>
-              <a:rPr lang="en-US" altLang="zh-TW" dirty="0">
-                <a:hlinkClick r:id="rId3"/>
-              </a:rPr>
-              <a:t>http://pro.ctlok.com/blog/2012/07/18/spring-integrate-jpa.html</a:t>
-            </a:r>
-            <a:endParaRPr lang="en-US" altLang="zh-TW" dirty="0"/>
-          </a:p>
-          <a:p>
-            <a:r>
-              <a:rPr lang="en-US" altLang="zh-TW" dirty="0">
-                <a:hlinkClick r:id="rId4"/>
-              </a:rPr>
-              <a:t>https://www.cnblogs.com/dreamroute/p/5173896.html</a:t>
-            </a:r>
-            <a:endParaRPr lang="en-US" altLang="zh-TW" dirty="0"/>
-          </a:p>
-          <a:p>
-            <a:r>
-              <a:rPr lang="en-US" altLang="zh-TW" dirty="0">
-                <a:hlinkClick r:id="rId5"/>
-              </a:rPr>
-              <a:t>https://www.ibm.com/developerworks/cn/opensource/os-cn-spring-jpa/</a:t>
-            </a:r>
-            <a:endParaRPr lang="en-US" altLang="zh-TW" dirty="0"/>
-          </a:p>
           <a:p>
             <a:endParaRPr lang="zh-TW" altLang="en-US" dirty="0"/>
           </a:p>
@@ -5435,7 +5430,7 @@
     </p:spTree>
     <p:extLst>
       <p:ext uri="{BB962C8B-B14F-4D97-AF65-F5344CB8AC3E}">
-        <p14:creationId xmlns:p14="http://schemas.microsoft.com/office/powerpoint/2010/main" val="2205528178"/>
+        <p14:creationId xmlns:p14="http://schemas.microsoft.com/office/powerpoint/2010/main" val="2349993791"/>
       </p:ext>
     </p:extLst>
   </p:cSld>
@@ -5479,11 +5474,11 @@
           <a:p>
             <a:r>
               <a:rPr lang="en-US" altLang="zh-TW" dirty="0"/>
-              <a:t>Hibernate</a:t>
+              <a:t>Spring JPA </a:t>
             </a:r>
             <a:r>
               <a:rPr lang="zh-TW" altLang="en-US" dirty="0"/>
-              <a:t>參數說明</a:t>
+              <a:t>配置</a:t>
             </a:r>
           </a:p>
         </p:txBody>
@@ -5507,7 +5502,7 @@
               <a:rPr lang="en-US" altLang="zh-TW" dirty="0">
                 <a:hlinkClick r:id="rId2"/>
               </a:rPr>
-              <a:t>https://docs.jboss.org/hibernate/orm/3.3/reference/en-US/html/session-configuration.html</a:t>
+              <a:t>https://stevenitlife.blogspot.tw/2016/03/hibernate-spring-jpa-configure.html</a:t>
             </a:r>
             <a:endParaRPr lang="en-US" altLang="zh-TW" dirty="0"/>
           </a:p>
@@ -5516,7 +5511,25 @@
               <a:rPr lang="en-US" altLang="zh-TW" dirty="0">
                 <a:hlinkClick r:id="rId3"/>
               </a:rPr>
-              <a:t>https://sites.google.com/a/mis.nsysu.edu.tw/cheng-shi-zi-xun-wang/java-ee-jin-jie-pian/hibernate-ji-shu/ji-chu-ru-men/jian-dan-fan-li/di-yi-gehibernate-cheng-shi</a:t>
+              <a:t>http://pro.ctlok.com/blog/2012/07/18/spring-integrate-jpa.html</a:t>
+            </a:r>
+            <a:endParaRPr lang="en-US" altLang="zh-TW" dirty="0"/>
+          </a:p>
+          <a:p>
+            <a:r>
+              <a:rPr lang="en-US" altLang="zh-TW" dirty="0">
+                <a:hlinkClick r:id="rId4"/>
+              </a:rPr>
+              <a:t>https://www.cnblogs.com/dreamroute/p/5173896.html</a:t>
+            </a:r>
+            <a:endParaRPr lang="en-US" altLang="zh-TW" dirty="0"/>
+          </a:p>
+          <a:p>
+            <a:r>
+              <a:rPr lang="en-US" altLang="zh-TW" dirty="0">
+                <a:hlinkClick r:id="rId5"/>
+              </a:rPr>
+              <a:t>https://www.ibm.com/developerworks/cn/opensource/os-cn-spring-jpa/</a:t>
             </a:r>
             <a:endParaRPr lang="en-US" altLang="zh-TW" dirty="0"/>
           </a:p>
@@ -5528,7 +5541,7 @@
     </p:spTree>
     <p:extLst>
       <p:ext uri="{BB962C8B-B14F-4D97-AF65-F5344CB8AC3E}">
-        <p14:creationId xmlns:p14="http://schemas.microsoft.com/office/powerpoint/2010/main" val="2390053485"/>
+        <p14:creationId xmlns:p14="http://schemas.microsoft.com/office/powerpoint/2010/main" val="2205528178"/>
       </p:ext>
     </p:extLst>
   </p:cSld>
@@ -5656,6 +5669,99 @@
 </file>
 
 <file path=ppt/slides/slide20.xml><?xml version="1.0" encoding="utf-8"?>
+<p:sld xmlns:a="http://schemas.openxmlformats.org/drawingml/2006/main" xmlns:r="http://schemas.openxmlformats.org/officeDocument/2006/relationships" xmlns:p="http://schemas.openxmlformats.org/presentationml/2006/main">
+  <p:cSld>
+    <p:spTree>
+      <p:nvGrpSpPr>
+        <p:cNvPr id="1" name=""/>
+        <p:cNvGrpSpPr/>
+        <p:nvPr/>
+      </p:nvGrpSpPr>
+      <p:grpSpPr>
+        <a:xfrm>
+          <a:off x="0" y="0"/>
+          <a:ext cx="0" cy="0"/>
+          <a:chOff x="0" y="0"/>
+          <a:chExt cx="0" cy="0"/>
+        </a:xfrm>
+      </p:grpSpPr>
+      <p:sp>
+        <p:nvSpPr>
+          <p:cNvPr id="2" name="標題 1"/>
+          <p:cNvSpPr>
+            <a:spLocks noGrp="1"/>
+          </p:cNvSpPr>
+          <p:nvPr>
+            <p:ph type="title"/>
+          </p:nvPr>
+        </p:nvSpPr>
+        <p:spPr/>
+        <p:txBody>
+          <a:bodyPr/>
+          <a:lstStyle/>
+          <a:p>
+            <a:r>
+              <a:rPr lang="en-US" altLang="zh-TW" dirty="0"/>
+              <a:t>Hibernate</a:t>
+            </a:r>
+            <a:r>
+              <a:rPr lang="zh-TW" altLang="en-US" dirty="0"/>
+              <a:t>參數說明</a:t>
+            </a:r>
+          </a:p>
+        </p:txBody>
+      </p:sp>
+      <p:sp>
+        <p:nvSpPr>
+          <p:cNvPr id="3" name="內容版面配置區 2"/>
+          <p:cNvSpPr>
+            <a:spLocks noGrp="1"/>
+          </p:cNvSpPr>
+          <p:nvPr>
+            <p:ph sz="quarter" idx="1"/>
+          </p:nvPr>
+        </p:nvSpPr>
+        <p:spPr/>
+        <p:txBody>
+          <a:bodyPr/>
+          <a:lstStyle/>
+          <a:p>
+            <a:r>
+              <a:rPr lang="en-US" altLang="zh-TW" dirty="0">
+                <a:hlinkClick r:id="rId2"/>
+              </a:rPr>
+              <a:t>https://docs.jboss.org/hibernate/orm/3.3/reference/en-US/html/session-configuration.html</a:t>
+            </a:r>
+            <a:endParaRPr lang="en-US" altLang="zh-TW" dirty="0"/>
+          </a:p>
+          <a:p>
+            <a:r>
+              <a:rPr lang="en-US" altLang="zh-TW" dirty="0">
+                <a:hlinkClick r:id="rId3"/>
+              </a:rPr>
+              <a:t>https://sites.google.com/a/mis.nsysu.edu.tw/cheng-shi-zi-xun-wang/java-ee-jin-jie-pian/hibernate-ji-shu/ji-chu-ru-men/jian-dan-fan-li/di-yi-gehibernate-cheng-shi</a:t>
+            </a:r>
+            <a:endParaRPr lang="en-US" altLang="zh-TW" dirty="0"/>
+          </a:p>
+          <a:p>
+            <a:endParaRPr lang="zh-TW" altLang="en-US" dirty="0"/>
+          </a:p>
+        </p:txBody>
+      </p:sp>
+    </p:spTree>
+    <p:extLst>
+      <p:ext uri="{BB962C8B-B14F-4D97-AF65-F5344CB8AC3E}">
+        <p14:creationId xmlns:p14="http://schemas.microsoft.com/office/powerpoint/2010/main" val="2390053485"/>
+      </p:ext>
+    </p:extLst>
+  </p:cSld>
+  <p:clrMapOvr>
+    <a:masterClrMapping/>
+  </p:clrMapOvr>
+</p:sld>
+</file>
+
+<file path=ppt/slides/slide21.xml><?xml version="1.0" encoding="utf-8"?>
 <p:sld xmlns:a="http://schemas.openxmlformats.org/drawingml/2006/main" xmlns:r="http://schemas.openxmlformats.org/officeDocument/2006/relationships" xmlns:p="http://schemas.openxmlformats.org/presentationml/2006/main">
   <p:cSld>
     <p:spTree>

</xml_diff>